<commit_message>
typos and all that
</commit_message>
<xml_diff>
--- a/CSS_Taster.pptx
+++ b/CSS_Taster.pptx
@@ -224,7 +224,7 @@
             </a:lvl1pPr>
           </a:lstStyle>
           <a:p>
-            <a:endParaRPr lang="en-US"/>
+            <a:endParaRPr lang="en-US" dirty="0"/>
           </a:p>
         </p:txBody>
       </p:sp>
@@ -259,7 +259,7 @@
               <a:rPr lang="en-US" smtClean="0"/>
               <a:t>07/12/2015</a:t>
             </a:fld>
-            <a:endParaRPr lang="en-US"/>
+            <a:endParaRPr lang="en-US" dirty="0"/>
           </a:p>
         </p:txBody>
       </p:sp>
@@ -292,7 +292,7 @@
           <a:bodyPr vert="horz" lIns="91440" tIns="45720" rIns="91440" bIns="45720" rtlCol="0" anchor="ctr"/>
           <a:lstStyle/>
           <a:p>
-            <a:endParaRPr lang="en-US"/>
+            <a:endParaRPr lang="en-US" dirty="0"/>
           </a:p>
         </p:txBody>
       </p:sp>
@@ -383,7 +383,7 @@
             </a:lvl1pPr>
           </a:lstStyle>
           <a:p>
-            <a:endParaRPr lang="en-US"/>
+            <a:endParaRPr lang="en-US" dirty="0"/>
           </a:p>
         </p:txBody>
       </p:sp>
@@ -418,7 +418,7 @@
               <a:rPr lang="en-US" smtClean="0"/>
               <a:t>‹#›</a:t>
             </a:fld>
-            <a:endParaRPr lang="en-US"/>
+            <a:endParaRPr lang="en-US" dirty="0"/>
           </a:p>
         </p:txBody>
       </p:sp>
@@ -571,19 +571,7 @@
           <a:p>
             <a:r>
               <a:rPr lang="en-US" dirty="0" smtClean="0"/>
-              <a:t>http://</a:t>
-            </a:r>
-            <a:r>
-              <a:rPr lang="en-US" dirty="0" err="1" smtClean="0"/>
-              <a:t>codepen.io</a:t>
-            </a:r>
-            <a:r>
-              <a:rPr lang="en-US" dirty="0" smtClean="0"/>
-              <a:t>/anon/pen/</a:t>
-            </a:r>
-            <a:r>
-              <a:rPr lang="en-US" dirty="0" err="1" smtClean="0"/>
-              <a:t>RrwLpK</a:t>
+              <a:t>http://codepen.io/anon/pen/RrwLpK</a:t>
             </a:r>
             <a:endParaRPr lang="en-US" dirty="0"/>
           </a:p>
@@ -608,7 +596,7 @@
               <a:rPr lang="en-US" smtClean="0"/>
               <a:t>22</a:t>
             </a:fld>
-            <a:endParaRPr lang="en-US"/>
+            <a:endParaRPr lang="en-US" dirty="0"/>
           </a:p>
         </p:txBody>
       </p:sp>
@@ -822,7 +810,7 @@
               <a:pPr/>
               <a:t>07/12/2015</a:t>
             </a:fld>
-            <a:endParaRPr lang="en-US"/>
+            <a:endParaRPr lang="en-US" dirty="0"/>
           </a:p>
         </p:txBody>
       </p:sp>
@@ -841,7 +829,7 @@
           <a:bodyPr/>
           <a:lstStyle/>
           <a:p>
-            <a:endParaRPr lang="en-US"/>
+            <a:endParaRPr lang="en-US" dirty="0"/>
           </a:p>
         </p:txBody>
       </p:sp>
@@ -989,7 +977,7 @@
               <a:pPr/>
               <a:t>07/12/2015</a:t>
             </a:fld>
-            <a:endParaRPr lang="en-US"/>
+            <a:endParaRPr lang="en-US" dirty="0"/>
           </a:p>
         </p:txBody>
       </p:sp>
@@ -1008,7 +996,7 @@
           <a:bodyPr/>
           <a:lstStyle/>
           <a:p>
-            <a:endParaRPr lang="en-US"/>
+            <a:endParaRPr lang="en-US" dirty="0"/>
           </a:p>
         </p:txBody>
       </p:sp>
@@ -1032,7 +1020,7 @@
               <a:pPr/>
               <a:t>‹#›</a:t>
             </a:fld>
-            <a:endParaRPr lang="en-US"/>
+            <a:endParaRPr lang="en-US" dirty="0"/>
           </a:p>
         </p:txBody>
       </p:sp>
@@ -1166,7 +1154,7 @@
               <a:pPr/>
               <a:t>07/12/2015</a:t>
             </a:fld>
-            <a:endParaRPr lang="en-US"/>
+            <a:endParaRPr lang="en-US" dirty="0"/>
           </a:p>
         </p:txBody>
       </p:sp>
@@ -1185,7 +1173,7 @@
           <a:bodyPr/>
           <a:lstStyle/>
           <a:p>
-            <a:endParaRPr lang="en-US"/>
+            <a:endParaRPr lang="en-US" dirty="0"/>
           </a:p>
         </p:txBody>
       </p:sp>
@@ -1209,7 +1197,7 @@
               <a:pPr/>
               <a:t>‹#›</a:t>
             </a:fld>
-            <a:endParaRPr lang="en-US"/>
+            <a:endParaRPr lang="en-US" dirty="0"/>
           </a:p>
         </p:txBody>
       </p:sp>
@@ -1333,7 +1321,7 @@
               <a:pPr/>
               <a:t>07/12/2015</a:t>
             </a:fld>
-            <a:endParaRPr lang="en-US"/>
+            <a:endParaRPr lang="en-US" dirty="0"/>
           </a:p>
         </p:txBody>
       </p:sp>
@@ -1352,7 +1340,7 @@
           <a:bodyPr/>
           <a:lstStyle/>
           <a:p>
-            <a:endParaRPr lang="en-US"/>
+            <a:endParaRPr lang="en-US" dirty="0"/>
           </a:p>
         </p:txBody>
       </p:sp>
@@ -1376,7 +1364,7 @@
               <a:pPr/>
               <a:t>‹#›</a:t>
             </a:fld>
-            <a:endParaRPr lang="en-US"/>
+            <a:endParaRPr lang="en-US" dirty="0"/>
           </a:p>
         </p:txBody>
       </p:sp>
@@ -1576,7 +1564,7 @@
               <a:pPr/>
               <a:t>07/12/2015</a:t>
             </a:fld>
-            <a:endParaRPr lang="en-US"/>
+            <a:endParaRPr lang="en-US" dirty="0"/>
           </a:p>
         </p:txBody>
       </p:sp>
@@ -1619,7 +1607,7 @@
               <a:pPr/>
               <a:t>‹#›</a:t>
             </a:fld>
-            <a:endParaRPr lang="en-US"/>
+            <a:endParaRPr lang="en-US" dirty="0"/>
           </a:p>
         </p:txBody>
       </p:sp>
@@ -1861,7 +1849,7 @@
               <a:pPr/>
               <a:t>07/12/2015</a:t>
             </a:fld>
-            <a:endParaRPr lang="en-US"/>
+            <a:endParaRPr lang="en-US" dirty="0"/>
           </a:p>
         </p:txBody>
       </p:sp>
@@ -1880,7 +1868,7 @@
           <a:bodyPr/>
           <a:lstStyle/>
           <a:p>
-            <a:endParaRPr lang="en-US"/>
+            <a:endParaRPr lang="en-US" dirty="0"/>
           </a:p>
         </p:txBody>
       </p:sp>
@@ -1904,7 +1892,7 @@
               <a:pPr/>
               <a:t>‹#›</a:t>
             </a:fld>
-            <a:endParaRPr lang="en-US"/>
+            <a:endParaRPr lang="en-US" dirty="0"/>
           </a:p>
         </p:txBody>
       </p:sp>
@@ -2292,7 +2280,7 @@
               <a:pPr/>
               <a:t>07/12/2015</a:t>
             </a:fld>
-            <a:endParaRPr lang="en-US"/>
+            <a:endParaRPr lang="en-US" dirty="0"/>
           </a:p>
         </p:txBody>
       </p:sp>
@@ -2311,7 +2299,7 @@
           <a:bodyPr/>
           <a:lstStyle/>
           <a:p>
-            <a:endParaRPr lang="en-US"/>
+            <a:endParaRPr lang="en-US" dirty="0"/>
           </a:p>
         </p:txBody>
       </p:sp>
@@ -2335,7 +2323,7 @@
               <a:pPr/>
               <a:t>‹#›</a:t>
             </a:fld>
-            <a:endParaRPr lang="en-US"/>
+            <a:endParaRPr lang="en-US" dirty="0"/>
           </a:p>
         </p:txBody>
       </p:sp>
@@ -2407,7 +2395,7 @@
               <a:pPr/>
               <a:t>07/12/2015</a:t>
             </a:fld>
-            <a:endParaRPr lang="en-US"/>
+            <a:endParaRPr lang="en-US" dirty="0"/>
           </a:p>
         </p:txBody>
       </p:sp>
@@ -2426,7 +2414,7 @@
           <a:bodyPr/>
           <a:lstStyle/>
           <a:p>
-            <a:endParaRPr lang="en-US"/>
+            <a:endParaRPr lang="en-US" dirty="0"/>
           </a:p>
         </p:txBody>
       </p:sp>
@@ -2450,7 +2438,7 @@
               <a:pPr/>
               <a:t>‹#›</a:t>
             </a:fld>
-            <a:endParaRPr lang="en-US"/>
+            <a:endParaRPr lang="en-US" dirty="0"/>
           </a:p>
         </p:txBody>
       </p:sp>
@@ -2499,7 +2487,7 @@
               <a:pPr/>
               <a:t>07/12/2015</a:t>
             </a:fld>
-            <a:endParaRPr lang="en-US"/>
+            <a:endParaRPr lang="en-US" dirty="0"/>
           </a:p>
         </p:txBody>
       </p:sp>
@@ -2518,7 +2506,7 @@
           <a:bodyPr/>
           <a:lstStyle/>
           <a:p>
-            <a:endParaRPr lang="en-US"/>
+            <a:endParaRPr lang="en-US" dirty="0"/>
           </a:p>
         </p:txBody>
       </p:sp>
@@ -2542,7 +2530,7 @@
               <a:pPr/>
               <a:t>‹#›</a:t>
             </a:fld>
-            <a:endParaRPr lang="en-US"/>
+            <a:endParaRPr lang="en-US" dirty="0"/>
           </a:p>
         </p:txBody>
       </p:sp>
@@ -2690,7 +2678,7 @@
               <a:pPr/>
               <a:t>07/12/2015</a:t>
             </a:fld>
-            <a:endParaRPr lang="en-US"/>
+            <a:endParaRPr lang="en-US" dirty="0"/>
           </a:p>
         </p:txBody>
       </p:sp>
@@ -2709,7 +2697,7 @@
           <a:bodyPr/>
           <a:lstStyle/>
           <a:p>
-            <a:endParaRPr lang="en-US"/>
+            <a:endParaRPr lang="en-US" dirty="0"/>
           </a:p>
         </p:txBody>
       </p:sp>
@@ -2733,7 +2721,7 @@
               <a:pPr/>
               <a:t>‹#›</a:t>
             </a:fld>
-            <a:endParaRPr lang="en-US"/>
+            <a:endParaRPr lang="en-US" dirty="0"/>
           </a:p>
         </p:txBody>
       </p:sp>
@@ -2916,7 +2904,7 @@
           </a:lstStyle>
           <a:p>
             <a:r>
-              <a:rPr lang="en-US" smtClean="0"/>
+              <a:rPr lang="en-US" dirty="0" smtClean="0"/>
               <a:t>Click icon to add picture</a:t>
             </a:r>
             <a:endParaRPr lang="en-US" dirty="0"/>
@@ -3224,7 +3212,7 @@
           <a:lstStyle/>
           <a:p>
             <a:pPr algn="ctr"/>
-            <a:endParaRPr lang="en-US"/>
+            <a:endParaRPr lang="en-US" dirty="0"/>
           </a:p>
         </p:txBody>
       </p:sp>
@@ -3270,7 +3258,7 @@
           <a:lstStyle/>
           <a:p>
             <a:pPr algn="ctr"/>
-            <a:endParaRPr lang="en-US"/>
+            <a:endParaRPr lang="en-US" dirty="0"/>
           </a:p>
         </p:txBody>
       </p:sp>
@@ -3814,8 +3802,17 @@
           <a:p>
             <a:r>
               <a:rPr lang="en-US" dirty="0" smtClean="0"/>
-              <a:t>Browsers read CSS right to left.</a:t>
-            </a:r>
+              <a:t>Browsers read CSS right to </a:t>
+            </a:r>
+            <a:r>
+              <a:rPr lang="en-US" dirty="0" smtClean="0"/>
+              <a:t>left so make the last selector as specific as possible</a:t>
+            </a:r>
+            <a:r>
+              <a:rPr lang="en-US" dirty="0" smtClean="0"/>
+              <a:t> to quickly get matched.</a:t>
+            </a:r>
+            <a:endParaRPr lang="en-US" dirty="0" smtClean="0"/>
           </a:p>
           <a:p>
             <a:r>
@@ -3865,6 +3862,13 @@
   <p:clrMapOvr>
     <a:masterClrMapping/>
   </p:clrMapOvr>
+  <p:timing>
+    <p:tnLst>
+      <p:par>
+        <p:cTn xmlns:p14="http://schemas.microsoft.com/office/powerpoint/2010/main" id="1" dur="indefinite" restart="never" nodeType="tmRoot"/>
+      </p:par>
+    </p:tnLst>
+  </p:timing>
 </p:sld>
 </file>
 
@@ -4109,7 +4113,7 @@
               <a:t>Width can be set using a unit (e.g. </a:t>
             </a:r>
             <a:r>
-              <a:rPr lang="en-US" dirty="0" err="1" smtClean="0"/>
+              <a:rPr lang="en-US" dirty="0" smtClean="0"/>
               <a:t>px</a:t>
             </a:r>
             <a:r>
@@ -4117,7 +4121,7 @@
               <a:t>, cm, </a:t>
             </a:r>
             <a:r>
-              <a:rPr lang="en-US" dirty="0" err="1" smtClean="0"/>
+              <a:rPr lang="en-US" dirty="0" smtClean="0"/>
               <a:t>em</a:t>
             </a:r>
             <a:r>
@@ -4165,6 +4169,13 @@
   <p:clrMapOvr>
     <a:masterClrMapping/>
   </p:clrMapOvr>
+  <p:timing>
+    <p:tnLst>
+      <p:par>
+        <p:cTn xmlns:p14="http://schemas.microsoft.com/office/powerpoint/2010/main" id="1" dur="indefinite" restart="never" nodeType="tmRoot"/>
+      </p:par>
+    </p:tnLst>
+  </p:timing>
 </p:sld>
 </file>
 
@@ -4330,6 +4341,13 @@
   <p:clrMapOvr>
     <a:masterClrMapping/>
   </p:clrMapOvr>
+  <p:timing>
+    <p:tnLst>
+      <p:par>
+        <p:cTn xmlns:p14="http://schemas.microsoft.com/office/powerpoint/2010/main" id="1" dur="indefinite" restart="never" nodeType="tmRoot"/>
+      </p:par>
+    </p:tnLst>
+  </p:timing>
 </p:sld>
 </file>
 
@@ -4408,6 +4426,13 @@
   <p:clrMapOvr>
     <a:masterClrMapping/>
   </p:clrMapOvr>
+  <p:timing>
+    <p:tnLst>
+      <p:par>
+        <p:cTn xmlns:p14="http://schemas.microsoft.com/office/powerpoint/2010/main" id="1" dur="indefinite" restart="never" nodeType="tmRoot"/>
+      </p:par>
+    </p:tnLst>
+  </p:timing>
 </p:sld>
 </file>
 
@@ -4578,7 +4603,23 @@
           <a:p>
             <a:r>
               <a:rPr lang="en-US" dirty="0" smtClean="0"/>
-              <a:t>Will cause the element to loose its natural width because it looses its block element status, so it effectively becomes an inline element.</a:t>
+              <a:t>Will cause the element to </a:t>
+            </a:r>
+            <a:r>
+              <a:rPr lang="en-US" dirty="0" smtClean="0"/>
+              <a:t>lose </a:t>
+            </a:r>
+            <a:r>
+              <a:rPr lang="en-US" dirty="0" smtClean="0"/>
+              <a:t>its natural width because it </a:t>
+            </a:r>
+            <a:r>
+              <a:rPr lang="en-US" dirty="0" smtClean="0"/>
+              <a:t>loses </a:t>
+            </a:r>
+            <a:r>
+              <a:rPr lang="en-US" dirty="0" smtClean="0"/>
+              <a:t>its block element status, so it effectively becomes an inline element.</a:t>
             </a:r>
           </a:p>
           <a:p>
@@ -4680,7 +4721,11 @@
           <a:p>
             <a:r>
               <a:rPr lang="en-US" dirty="0" smtClean="0"/>
-              <a:t>Positions the element relative to its normal position.</a:t>
+              <a:t>Positions the element relative to its normal </a:t>
+            </a:r>
+            <a:r>
+              <a:rPr lang="en-US" dirty="0" smtClean="0"/>
+              <a:t>position. </a:t>
             </a:r>
           </a:p>
           <a:p>
@@ -4688,21 +4733,60 @@
               <a:rPr lang="en-US" dirty="0" smtClean="0"/>
               <a:t>E.g. </a:t>
             </a:r>
-          </a:p>
-          <a:p>
-            <a:r>
-              <a:rPr lang="en-US" dirty="0" err="1" smtClean="0"/>
-              <a:t>Positon</a:t>
-            </a:r>
-            <a:r>
-              <a:rPr lang="en-US" dirty="0" smtClean="0"/>
-              <a:t> :relative, left: 20px</a:t>
-            </a:r>
-          </a:p>
-          <a:p>
-            <a:r>
-              <a:rPr lang="en-US" dirty="0" smtClean="0"/>
-              <a:t>Would move the element left 20px</a:t>
+            <a:r>
+              <a:rPr lang="en-US" dirty="0" smtClean="0"/>
+              <a:t>adding </a:t>
+            </a:r>
+            <a:r>
+              <a:rPr lang="en-US" sz="1800" dirty="0" smtClean="0">
+                <a:latin typeface="Monaco"/>
+                <a:cs typeface="Monaco"/>
+              </a:rPr>
+              <a:t>‘position</a:t>
+            </a:r>
+            <a:r>
+              <a:rPr lang="en-US" sz="1800" dirty="0" smtClean="0">
+                <a:latin typeface="Monaco"/>
+                <a:cs typeface="Monaco"/>
+              </a:rPr>
+              <a:t>: relative</a:t>
+            </a:r>
+            <a:r>
+              <a:rPr lang="en-US" sz="1800" dirty="0" smtClean="0">
+                <a:latin typeface="Monaco"/>
+                <a:cs typeface="Monaco"/>
+              </a:rPr>
+              <a:t>, left: </a:t>
+            </a:r>
+            <a:r>
+              <a:rPr lang="en-US" sz="1800" dirty="0" smtClean="0">
+                <a:latin typeface="Monaco"/>
+                <a:cs typeface="Monaco"/>
+              </a:rPr>
+              <a:t>20px’</a:t>
+            </a:r>
+            <a:r>
+              <a:rPr lang="en-US" sz="1800" dirty="0">
+                <a:latin typeface="Monaco"/>
+                <a:cs typeface="Monaco"/>
+              </a:rPr>
+              <a:t> </a:t>
+            </a:r>
+            <a:r>
+              <a:rPr lang="en-US" dirty="0"/>
+              <a:t>w</a:t>
+            </a:r>
+            <a:r>
+              <a:rPr lang="en-US" dirty="0" smtClean="0"/>
+              <a:t>ould </a:t>
+            </a:r>
+            <a:r>
+              <a:rPr lang="en-US" dirty="0" smtClean="0"/>
+              <a:t>move the element left </a:t>
+            </a:r>
+            <a:r>
+              <a:rPr lang="en-US" dirty="0" smtClean="0"/>
+              <a:t>20px.</a:t>
             </a:r>
             <a:endParaRPr lang="en-US" dirty="0"/>
           </a:p>
@@ -4785,7 +4869,11 @@
           <a:p>
             <a:r>
               <a:rPr lang="en-US" dirty="0" smtClean="0"/>
-              <a:t>Allow you to understand which of the workshops you would benefit most from.</a:t>
+              <a:t>Allow you to understand which of the workshops you would benefit </a:t>
+            </a:r>
+            <a:r>
+              <a:rPr lang="en-US" dirty="0" smtClean="0"/>
+              <a:t>from most.</a:t>
             </a:r>
             <a:endParaRPr lang="en-US" dirty="0"/>
           </a:p>
@@ -4798,8 +4886,19 @@
           <a:p>
             <a:r>
               <a:rPr lang="en-US" dirty="0" smtClean="0"/>
-              <a:t>Quickly give you some general CSS tips and tricks.</a:t>
-            </a:r>
+              <a:t>Quickly give you some general CSS tips and tricks</a:t>
+            </a:r>
+            <a:r>
+              <a:rPr lang="en-US" dirty="0" smtClean="0"/>
+              <a:t>.</a:t>
+            </a:r>
+          </a:p>
+          <a:p>
+            <a:r>
+              <a:rPr lang="en-US" dirty="0" smtClean="0"/>
+              <a:t>Get you to engage and ask questions about everything we talk about today.</a:t>
+            </a:r>
+            <a:endParaRPr lang="en-US" dirty="0" smtClean="0"/>
           </a:p>
           <a:p>
             <a:endParaRPr lang="en-US" dirty="0" smtClean="0"/>
@@ -4992,7 +5091,15 @@
           <a:p>
             <a:r>
               <a:rPr lang="en-US" dirty="0" smtClean="0"/>
-              <a:t>Not effected by setting top, left, bottom or right.</a:t>
+              <a:t>Not </a:t>
+            </a:r>
+            <a:r>
+              <a:rPr lang="en-US" dirty="0" smtClean="0"/>
+              <a:t>affected </a:t>
+            </a:r>
+            <a:r>
+              <a:rPr lang="en-US" dirty="0" smtClean="0"/>
+              <a:t>by setting top, left, bottom or right.</a:t>
             </a:r>
           </a:p>
           <a:p>
@@ -5083,22 +5190,21 @@
           <a:p>
             <a:r>
               <a:rPr lang="en-US" dirty="0" smtClean="0"/>
-              <a:t>Used correctly can greatly reduces the code needed to style an element.</a:t>
-            </a:r>
-          </a:p>
-          <a:p>
-            <a:r>
-              <a:rPr lang="en-US" dirty="0" smtClean="0"/>
-              <a:t>Used incorrectly can cripples your </a:t>
-            </a:r>
-            <a:r>
-              <a:rPr lang="en-US" dirty="0" smtClean="0"/>
-              <a:t>whole </a:t>
-            </a:r>
-            <a:r>
-              <a:rPr lang="en-US" dirty="0" smtClean="0"/>
-              <a:t>application.</a:t>
-            </a:r>
+              <a:t>Used correctly can greatly </a:t>
+            </a:r>
+            <a:r>
+              <a:rPr lang="en-US" dirty="0" smtClean="0"/>
+              <a:t>reduce </a:t>
+            </a:r>
+            <a:r>
+              <a:rPr lang="en-US" dirty="0" smtClean="0"/>
+              <a:t>the code needed to style an element</a:t>
+            </a:r>
+            <a:r>
+              <a:rPr lang="en-US" dirty="0" smtClean="0"/>
+              <a:t>.</a:t>
+            </a:r>
+            <a:endParaRPr lang="en-US" dirty="0" smtClean="0"/>
           </a:p>
           <a:p>
             <a:r>
@@ -5117,7 +5223,7 @@
               <a:t>Textual properties (color, font, </a:t>
             </a:r>
             <a:r>
-              <a:rPr lang="en-US" dirty="0" err="1" smtClean="0"/>
+              <a:rPr lang="en-US" dirty="0" smtClean="0"/>
               <a:t>etc</a:t>
             </a:r>
             <a:r>
@@ -5161,7 +5267,7 @@
               <a:t>.</a:t>
             </a:r>
             <a:r>
-              <a:rPr lang="en-US" sz="1800" dirty="0" err="1" smtClean="0">
+              <a:rPr lang="en-US" sz="1800" dirty="0" smtClean="0">
                 <a:latin typeface="Monaco"/>
                 <a:cs typeface="Monaco"/>
               </a:rPr>
@@ -5333,7 +5439,7 @@
               <a:t>.</a:t>
             </a:r>
             <a:r>
-              <a:rPr lang="en-US" dirty="0" err="1" smtClean="0">
+              <a:rPr lang="en-US" dirty="0" smtClean="0">
                 <a:latin typeface="Monaco"/>
                 <a:cs typeface="Monaco"/>
               </a:rPr>
@@ -5359,7 +5465,7 @@
               <a:t>.</a:t>
             </a:r>
             <a:r>
-              <a:rPr lang="en-US" dirty="0" err="1" smtClean="0">
+              <a:rPr lang="en-US" dirty="0" smtClean="0">
                 <a:latin typeface="Monaco"/>
                 <a:cs typeface="Monaco"/>
               </a:rPr>
@@ -5668,6 +5774,13 @@
   <p:clrMapOvr>
     <a:masterClrMapping/>
   </p:clrMapOvr>
+  <p:timing>
+    <p:tnLst>
+      <p:par>
+        <p:cTn xmlns:p14="http://schemas.microsoft.com/office/powerpoint/2010/main" id="1" dur="indefinite" restart="never" nodeType="tmRoot"/>
+      </p:par>
+    </p:tnLst>
+  </p:timing>
 </p:sld>
 </file>
 
@@ -5735,7 +5848,7 @@
               <a:t>Use something like </a:t>
             </a:r>
             <a:r>
-              <a:rPr lang="en-US" dirty="0" err="1" smtClean="0"/>
+              <a:rPr lang="en-US" dirty="0" smtClean="0"/>
               <a:t>codepen</a:t>
             </a:r>
             <a:r>
@@ -6331,7 +6444,7 @@
               <a:t>e.g. .content .</a:t>
             </a:r>
             <a:r>
-              <a:rPr lang="en-GB" dirty="0" err="1" smtClean="0"/>
+              <a:rPr lang="en-GB" dirty="0" smtClean="0"/>
               <a:t>btn</a:t>
             </a:r>
             <a:r>
@@ -6339,7 +6452,7 @@
               <a:t> {padding: 10px} should actually be .</a:t>
             </a:r>
             <a:r>
-              <a:rPr lang="en-GB" dirty="0" err="1" smtClean="0"/>
+              <a:rPr lang="en-GB" dirty="0" smtClean="0"/>
               <a:t>btn</a:t>
             </a:r>
             <a:r>
@@ -6372,6 +6485,13 @@
   <p:clrMapOvr>
     <a:masterClrMapping/>
   </p:clrMapOvr>
+  <p:timing>
+    <p:tnLst>
+      <p:par>
+        <p:cTn xmlns:p14="http://schemas.microsoft.com/office/powerpoint/2010/main" id="1" dur="indefinite" restart="never" nodeType="tmRoot"/>
+      </p:par>
+    </p:tnLst>
+  </p:timing>
 </p:sld>
 </file>
 
@@ -6564,7 +6684,7 @@
               <a:t>#</a:t>
             </a:r>
             <a:r>
-              <a:rPr lang="en-US" sz="2400" dirty="0" err="1">
+              <a:rPr lang="en-US" sz="2400" dirty="0">
                 <a:latin typeface="Monaco"/>
                 <a:cs typeface="Monaco"/>
               </a:rPr>
@@ -6614,7 +6734,7 @@
               <a:t>.</a:t>
             </a:r>
             <a:r>
-              <a:rPr lang="en-US" sz="2400" dirty="0" err="1">
+              <a:rPr lang="en-US" sz="2400" dirty="0">
                 <a:latin typeface="Monaco"/>
                 <a:cs typeface="Monaco"/>
               </a:rPr>
@@ -6784,7 +6904,7 @@
               <a:t>http://</a:t>
             </a:r>
             <a:r>
-              <a:rPr lang="en-US" dirty="0" err="1"/>
+              <a:rPr lang="en-US" dirty="0"/>
               <a:t>specificity.keegan.st</a:t>
             </a:r>
             <a:r>
@@ -7105,7 +7225,7 @@
               <a:t>#</a:t>
             </a:r>
             <a:r>
-              <a:rPr lang="en-US" dirty="0" err="1" smtClean="0">
+              <a:rPr lang="en-US" dirty="0" smtClean="0">
                 <a:latin typeface="Monaco"/>
                 <a:cs typeface="Monaco"/>
               </a:rPr>
@@ -7357,13 +7477,21 @@
           <a:p>
             <a:r>
               <a:rPr lang="en-US" dirty="0" smtClean="0"/>
-              <a:t>ID’s have a high specificity making them difficult to override.</a:t>
-            </a:r>
-          </a:p>
-          <a:p>
-            <a:r>
-              <a:rPr lang="en-US" dirty="0" smtClean="0"/>
-              <a:t>ID’s are not reusable, a single class can be added to </a:t>
+              <a:t>ID’s have a </a:t>
+            </a:r>
+            <a:r>
+              <a:rPr lang="en-US" dirty="0" smtClean="0"/>
+              <a:t>high specificity making them difficult to override.</a:t>
+            </a:r>
+          </a:p>
+          <a:p>
+            <a:r>
+              <a:rPr lang="en-US" dirty="0" smtClean="0"/>
+              <a:t>ID’s are </a:t>
+            </a:r>
+            <a:r>
+              <a:rPr lang="en-US" dirty="0" smtClean="0"/>
+              <a:t>not reusable, a single class can be added to </a:t>
             </a:r>
             <a:r>
               <a:rPr lang="en-US" dirty="0" smtClean="0"/>
@@ -7377,7 +7505,27 @@
           <a:p>
             <a:r>
               <a:rPr lang="en-US" dirty="0" smtClean="0"/>
-              <a:t>A single element has one id which means you cant use composition to build up your styles.</a:t>
+              <a:t>A single element has one </a:t>
+            </a:r>
+            <a:r>
+              <a:rPr lang="en-US" dirty="0" smtClean="0"/>
+              <a:t>ID</a:t>
+            </a:r>
+            <a:r>
+              <a:rPr lang="en-US" dirty="0" smtClean="0"/>
+              <a:t> </a:t>
+            </a:r>
+            <a:r>
+              <a:rPr lang="en-US" dirty="0" smtClean="0"/>
+              <a:t>which means you </a:t>
+            </a:r>
+            <a:r>
+              <a:rPr lang="en-US" dirty="0" smtClean="0"/>
+              <a:t>can’t </a:t>
+            </a:r>
+            <a:r>
+              <a:rPr lang="en-US" dirty="0" smtClean="0"/>
+              <a:t>use composition to build up your styles.</a:t>
             </a:r>
           </a:p>
           <a:p>
@@ -7401,6 +7549,13 @@
   <p:clrMapOvr>
     <a:masterClrMapping/>
   </p:clrMapOvr>
+  <p:timing>
+    <p:tnLst>
+      <p:par>
+        <p:cTn xmlns:p14="http://schemas.microsoft.com/office/powerpoint/2010/main" id="1" dur="indefinite" restart="never" nodeType="tmRoot"/>
+      </p:par>
+    </p:tnLst>
+  </p:timing>
 </p:sld>
 </file>
 

</xml_diff>